<commit_message>
Update Figure 1 and OHBM
</commit_message>
<xml_diff>
--- a/presentation/OHBM2020/Figure1.pptx
+++ b/presentation/OHBM2020/Figure1.pptx
@@ -104,6 +104,11 @@
       </a:defRPr>
     </a:lvl9pPr>
   </p:defaultTextStyle>
+  <p:extLst>
+    <p:ext uri="{EFAFB233-063F-42B5-8137-9DF3F51BA10A}">
+      <p15:sldGuideLst xmlns:p15="http://schemas.microsoft.com/office/powerpoint/2012/main"/>
+    </p:ext>
+  </p:extLst>
 </p:presentation>
 </file>
 
@@ -238,7 +243,7 @@
           <a:p>
             <a:fld id="{99D86DFF-0522-4F85-932F-181CAB099252}" type="datetimeFigureOut">
               <a:rPr lang="en-US" smtClean="0"/>
-              <a:t>12/5/2019</a:t>
+              <a:t>12/9/2019</a:t>
             </a:fld>
             <a:endParaRPr lang="en-US"/>
           </a:p>
@@ -408,7 +413,7 @@
           <a:p>
             <a:fld id="{99D86DFF-0522-4F85-932F-181CAB099252}" type="datetimeFigureOut">
               <a:rPr lang="en-US" smtClean="0"/>
-              <a:t>12/5/2019</a:t>
+              <a:t>12/9/2019</a:t>
             </a:fld>
             <a:endParaRPr lang="en-US"/>
           </a:p>
@@ -588,7 +593,7 @@
           <a:p>
             <a:fld id="{99D86DFF-0522-4F85-932F-181CAB099252}" type="datetimeFigureOut">
               <a:rPr lang="en-US" smtClean="0"/>
-              <a:t>12/5/2019</a:t>
+              <a:t>12/9/2019</a:t>
             </a:fld>
             <a:endParaRPr lang="en-US"/>
           </a:p>
@@ -758,7 +763,7 @@
           <a:p>
             <a:fld id="{99D86DFF-0522-4F85-932F-181CAB099252}" type="datetimeFigureOut">
               <a:rPr lang="en-US" smtClean="0"/>
-              <a:t>12/5/2019</a:t>
+              <a:t>12/9/2019</a:t>
             </a:fld>
             <a:endParaRPr lang="en-US"/>
           </a:p>
@@ -1002,7 +1007,7 @@
           <a:p>
             <a:fld id="{99D86DFF-0522-4F85-932F-181CAB099252}" type="datetimeFigureOut">
               <a:rPr lang="en-US" smtClean="0"/>
-              <a:t>12/5/2019</a:t>
+              <a:t>12/9/2019</a:t>
             </a:fld>
             <a:endParaRPr lang="en-US"/>
           </a:p>
@@ -1234,7 +1239,7 @@
           <a:p>
             <a:fld id="{99D86DFF-0522-4F85-932F-181CAB099252}" type="datetimeFigureOut">
               <a:rPr lang="en-US" smtClean="0"/>
-              <a:t>12/5/2019</a:t>
+              <a:t>12/9/2019</a:t>
             </a:fld>
             <a:endParaRPr lang="en-US"/>
           </a:p>
@@ -1601,7 +1606,7 @@
           <a:p>
             <a:fld id="{99D86DFF-0522-4F85-932F-181CAB099252}" type="datetimeFigureOut">
               <a:rPr lang="en-US" smtClean="0"/>
-              <a:t>12/5/2019</a:t>
+              <a:t>12/9/2019</a:t>
             </a:fld>
             <a:endParaRPr lang="en-US"/>
           </a:p>
@@ -1719,7 +1724,7 @@
           <a:p>
             <a:fld id="{99D86DFF-0522-4F85-932F-181CAB099252}" type="datetimeFigureOut">
               <a:rPr lang="en-US" smtClean="0"/>
-              <a:t>12/5/2019</a:t>
+              <a:t>12/9/2019</a:t>
             </a:fld>
             <a:endParaRPr lang="en-US"/>
           </a:p>
@@ -1814,7 +1819,7 @@
           <a:p>
             <a:fld id="{99D86DFF-0522-4F85-932F-181CAB099252}" type="datetimeFigureOut">
               <a:rPr lang="en-US" smtClean="0"/>
-              <a:t>12/5/2019</a:t>
+              <a:t>12/9/2019</a:t>
             </a:fld>
             <a:endParaRPr lang="en-US"/>
           </a:p>
@@ -2091,7 +2096,7 @@
           <a:p>
             <a:fld id="{99D86DFF-0522-4F85-932F-181CAB099252}" type="datetimeFigureOut">
               <a:rPr lang="en-US" smtClean="0"/>
-              <a:t>12/5/2019</a:t>
+              <a:t>12/9/2019</a:t>
             </a:fld>
             <a:endParaRPr lang="en-US"/>
           </a:p>
@@ -2348,7 +2353,7 @@
           <a:p>
             <a:fld id="{99D86DFF-0522-4F85-932F-181CAB099252}" type="datetimeFigureOut">
               <a:rPr lang="en-US" smtClean="0"/>
-              <a:t>12/5/2019</a:t>
+              <a:t>12/9/2019</a:t>
             </a:fld>
             <a:endParaRPr lang="en-US"/>
           </a:p>
@@ -2561,7 +2566,7 @@
           <a:p>
             <a:fld id="{99D86DFF-0522-4F85-932F-181CAB099252}" type="datetimeFigureOut">
               <a:rPr lang="en-US" smtClean="0"/>
-              <a:t>12/5/2019</a:t>
+              <a:t>12/9/2019</a:t>
             </a:fld>
             <a:endParaRPr lang="en-US"/>
           </a:p>
@@ -2968,10 +2973,10 @@
       </p:grpSpPr>
       <p:pic>
         <p:nvPicPr>
-          <p:cNvPr id="529" name="Picture 528">
+          <p:cNvPr id="606" name="Picture 605">
             <a:extLst>
               <a:ext uri="{FF2B5EF4-FFF2-40B4-BE49-F238E27FC236}">
-                <a16:creationId xmlns:a16="http://schemas.microsoft.com/office/drawing/2014/main" id="{308C6A4F-71F8-4C6F-AA27-4DB09C52A962}"/>
+                <a16:creationId xmlns:a16="http://schemas.microsoft.com/office/drawing/2014/main" id="{4DC482B1-AED3-4917-A060-083F974FF377}"/>
               </a:ext>
             </a:extLst>
           </p:cNvPr>
@@ -2988,36 +2993,6 @@
         </p:blipFill>
         <p:spPr>
           <a:xfrm>
-            <a:off x="601627" y="1311436"/>
-            <a:ext cx="2987074" cy="2091823"/>
-          </a:xfrm>
-          <a:prstGeom prst="rect">
-            <a:avLst/>
-          </a:prstGeom>
-        </p:spPr>
-      </p:pic>
-      <p:pic>
-        <p:nvPicPr>
-          <p:cNvPr id="606" name="Picture 605">
-            <a:extLst>
-              <a:ext uri="{FF2B5EF4-FFF2-40B4-BE49-F238E27FC236}">
-                <a16:creationId xmlns:a16="http://schemas.microsoft.com/office/drawing/2014/main" id="{4DC482B1-AED3-4917-A060-083F974FF377}"/>
-              </a:ext>
-            </a:extLst>
-          </p:cNvPr>
-          <p:cNvPicPr>
-            <a:picLocks noChangeAspect="1"/>
-          </p:cNvPicPr>
-          <p:nvPr/>
-        </p:nvPicPr>
-        <p:blipFill>
-          <a:blip r:embed="rId3"/>
-          <a:stretch>
-            <a:fillRect/>
-          </a:stretch>
-        </p:blipFill>
-        <p:spPr>
-          <a:xfrm>
             <a:off x="-16626" y="72918"/>
             <a:ext cx="4206875" cy="935452"/>
           </a:xfrm>
@@ -3040,7 +3015,7 @@
         </p:nvSpPr>
         <p:spPr>
           <a:xfrm>
-            <a:off x="2219498" y="1000087"/>
+            <a:off x="2219498" y="951962"/>
             <a:ext cx="74815" cy="159816"/>
           </a:xfrm>
           <a:prstGeom prst="downArrow">
@@ -3086,7 +3061,7 @@
         </p:nvSpPr>
         <p:spPr>
           <a:xfrm>
-            <a:off x="2219498" y="3461984"/>
+            <a:off x="2227771" y="3875996"/>
             <a:ext cx="74815" cy="159816"/>
           </a:xfrm>
           <a:prstGeom prst="downArrow">
@@ -3132,7 +3107,7 @@
         </p:nvSpPr>
         <p:spPr>
           <a:xfrm>
-            <a:off x="249562" y="3654524"/>
+            <a:off x="257835" y="4041036"/>
             <a:ext cx="4089502" cy="553998"/>
           </a:xfrm>
           <a:prstGeom prst="rect">
@@ -3185,7 +3160,7 @@
         </p:nvSpPr>
         <p:spPr>
           <a:xfrm>
-            <a:off x="2219498" y="4323758"/>
+            <a:off x="2236281" y="4471515"/>
             <a:ext cx="74815" cy="159816"/>
           </a:xfrm>
           <a:prstGeom prst="downArrow">
@@ -3231,7 +3206,7 @@
         </p:nvSpPr>
         <p:spPr>
           <a:xfrm>
-            <a:off x="1953490" y="4598810"/>
+            <a:off x="1970273" y="4746567"/>
             <a:ext cx="606830" cy="301790"/>
           </a:xfrm>
           <a:prstGeom prst="rect">
@@ -3266,6 +3241,36 @@
           </a:p>
         </p:txBody>
       </p:sp>
+      <p:pic>
+        <p:nvPicPr>
+          <p:cNvPr id="2" name="Picture 1">
+            <a:extLst>
+              <a:ext uri="{FF2B5EF4-FFF2-40B4-BE49-F238E27FC236}">
+                <a16:creationId xmlns:a16="http://schemas.microsoft.com/office/drawing/2014/main" id="{F5DFF1D2-EAE0-492C-9023-129544E9A24E}"/>
+              </a:ext>
+            </a:extLst>
+          </p:cNvPr>
+          <p:cNvPicPr>
+            <a:picLocks noChangeAspect="1"/>
+          </p:cNvPicPr>
+          <p:nvPr/>
+        </p:nvPicPr>
+        <p:blipFill>
+          <a:blip r:embed="rId3"/>
+          <a:stretch>
+            <a:fillRect/>
+          </a:stretch>
+        </p:blipFill>
+        <p:spPr>
+          <a:xfrm>
+            <a:off x="-27501" y="1151174"/>
+            <a:ext cx="4206875" cy="2674978"/>
+          </a:xfrm>
+          <a:prstGeom prst="rect">
+            <a:avLst/>
+          </a:prstGeom>
+        </p:spPr>
+      </p:pic>
     </p:spTree>
     <p:extLst>
       <p:ext uri="{BB962C8B-B14F-4D97-AF65-F5344CB8AC3E}">

</xml_diff>

<commit_message>
Update abstract with figure 1
</commit_message>
<xml_diff>
--- a/presentation/OHBM2020/Figure1.pptx
+++ b/presentation/OHBM2020/Figure1.pptx
@@ -3061,7 +3061,7 @@
         </p:nvSpPr>
         <p:spPr>
           <a:xfrm>
-            <a:off x="2227771" y="3875996"/>
+            <a:off x="2182091" y="3875996"/>
             <a:ext cx="74815" cy="159816"/>
           </a:xfrm>
           <a:prstGeom prst="downArrow">
@@ -3160,7 +3160,7 @@
         </p:nvSpPr>
         <p:spPr>
           <a:xfrm>
-            <a:off x="2236281" y="4471515"/>
+            <a:off x="2182091" y="4471515"/>
             <a:ext cx="74815" cy="159816"/>
           </a:xfrm>
           <a:prstGeom prst="downArrow">
@@ -3206,7 +3206,7 @@
         </p:nvSpPr>
         <p:spPr>
           <a:xfrm>
-            <a:off x="1970273" y="4746567"/>
+            <a:off x="1916083" y="4746567"/>
             <a:ext cx="606830" cy="301790"/>
           </a:xfrm>
           <a:prstGeom prst="rect">
@@ -3263,14 +3263,90 @@
         </p:blipFill>
         <p:spPr>
           <a:xfrm>
-            <a:off x="-27501" y="1151174"/>
-            <a:ext cx="4206875" cy="2674978"/>
+            <a:off x="341223" y="1677397"/>
+            <a:ext cx="3420727" cy="2175099"/>
           </a:xfrm>
           <a:prstGeom prst="rect">
             <a:avLst/>
           </a:prstGeom>
         </p:spPr>
       </p:pic>
+      <p:pic>
+        <p:nvPicPr>
+          <p:cNvPr id="3" name="Picture 2">
+            <a:extLst>
+              <a:ext uri="{FF2B5EF4-FFF2-40B4-BE49-F238E27FC236}">
+                <a16:creationId xmlns:a16="http://schemas.microsoft.com/office/drawing/2014/main" id="{41C15378-7036-488B-81F6-1E1D9011BCF6}"/>
+              </a:ext>
+            </a:extLst>
+          </p:cNvPr>
+          <p:cNvPicPr>
+            <a:picLocks noChangeAspect="1"/>
+          </p:cNvPicPr>
+          <p:nvPr/>
+        </p:nvPicPr>
+        <p:blipFill>
+          <a:blip r:embed="rId4"/>
+          <a:stretch>
+            <a:fillRect/>
+          </a:stretch>
+        </p:blipFill>
+        <p:spPr>
+          <a:xfrm>
+            <a:off x="2131061" y="1177086"/>
+            <a:ext cx="251687" cy="251687"/>
+          </a:xfrm>
+          <a:prstGeom prst="rect">
+            <a:avLst/>
+          </a:prstGeom>
+        </p:spPr>
+      </p:pic>
+      <p:sp>
+        <p:nvSpPr>
+          <p:cNvPr id="11" name="Arrow: Down 10">
+            <a:extLst>
+              <a:ext uri="{FF2B5EF4-FFF2-40B4-BE49-F238E27FC236}">
+                <a16:creationId xmlns:a16="http://schemas.microsoft.com/office/drawing/2014/main" id="{DFA5B2C0-D25B-46E0-A95B-B79D8CAA960E}"/>
+              </a:ext>
+            </a:extLst>
+          </p:cNvPr>
+          <p:cNvSpPr/>
+          <p:nvPr/>
+        </p:nvSpPr>
+        <p:spPr>
+          <a:xfrm>
+            <a:off x="2219498" y="1517581"/>
+            <a:ext cx="74815" cy="159816"/>
+          </a:xfrm>
+          <a:prstGeom prst="downArrow">
+            <a:avLst/>
+          </a:prstGeom>
+        </p:spPr>
+        <p:style>
+          <a:lnRef idx="2">
+            <a:schemeClr val="dk1">
+              <a:shade val="50000"/>
+            </a:schemeClr>
+          </a:lnRef>
+          <a:fillRef idx="1">
+            <a:schemeClr val="dk1"/>
+          </a:fillRef>
+          <a:effectRef idx="0">
+            <a:schemeClr val="dk1"/>
+          </a:effectRef>
+          <a:fontRef idx="minor">
+            <a:schemeClr val="lt1"/>
+          </a:fontRef>
+        </p:style>
+        <p:txBody>
+          <a:bodyPr rtlCol="0" anchor="ctr"/>
+          <a:lstStyle/>
+          <a:p>
+            <a:pPr algn="ctr"/>
+            <a:endParaRPr lang="en-US"/>
+          </a:p>
+        </p:txBody>
+      </p:sp>
     </p:spTree>
     <p:extLst>
       <p:ext uri="{BB962C8B-B14F-4D97-AF65-F5344CB8AC3E}">

</xml_diff>

<commit_message>
Update Figure 1 & abstract with updated fig & intext for Fig 1
</commit_message>
<xml_diff>
--- a/presentation/OHBM2020/Figure1.pptx
+++ b/presentation/OHBM2020/Figure1.pptx
@@ -6,6 +6,7 @@
   </p:sldMasterIdLst>
   <p:sldIdLst>
     <p:sldId id="256" r:id="rId2"/>
+    <p:sldId id="257" r:id="rId3"/>
   </p:sldIdLst>
   <p:sldSz cx="4206875" cy="5121275"/>
   <p:notesSz cx="6858000" cy="9144000"/>
@@ -243,7 +244,7 @@
           <a:p>
             <a:fld id="{99D86DFF-0522-4F85-932F-181CAB099252}" type="datetimeFigureOut">
               <a:rPr lang="en-US" smtClean="0"/>
-              <a:t>12/9/2019</a:t>
+              <a:t>12/9/19</a:t>
             </a:fld>
             <a:endParaRPr lang="en-US"/>
           </a:p>
@@ -413,7 +414,7 @@
           <a:p>
             <a:fld id="{99D86DFF-0522-4F85-932F-181CAB099252}" type="datetimeFigureOut">
               <a:rPr lang="en-US" smtClean="0"/>
-              <a:t>12/9/2019</a:t>
+              <a:t>12/9/19</a:t>
             </a:fld>
             <a:endParaRPr lang="en-US"/>
           </a:p>
@@ -593,7 +594,7 @@
           <a:p>
             <a:fld id="{99D86DFF-0522-4F85-932F-181CAB099252}" type="datetimeFigureOut">
               <a:rPr lang="en-US" smtClean="0"/>
-              <a:t>12/9/2019</a:t>
+              <a:t>12/9/19</a:t>
             </a:fld>
             <a:endParaRPr lang="en-US"/>
           </a:p>
@@ -763,7 +764,7 @@
           <a:p>
             <a:fld id="{99D86DFF-0522-4F85-932F-181CAB099252}" type="datetimeFigureOut">
               <a:rPr lang="en-US" smtClean="0"/>
-              <a:t>12/9/2019</a:t>
+              <a:t>12/9/19</a:t>
             </a:fld>
             <a:endParaRPr lang="en-US"/>
           </a:p>
@@ -1007,7 +1008,7 @@
           <a:p>
             <a:fld id="{99D86DFF-0522-4F85-932F-181CAB099252}" type="datetimeFigureOut">
               <a:rPr lang="en-US" smtClean="0"/>
-              <a:t>12/9/2019</a:t>
+              <a:t>12/9/19</a:t>
             </a:fld>
             <a:endParaRPr lang="en-US"/>
           </a:p>
@@ -1239,7 +1240,7 @@
           <a:p>
             <a:fld id="{99D86DFF-0522-4F85-932F-181CAB099252}" type="datetimeFigureOut">
               <a:rPr lang="en-US" smtClean="0"/>
-              <a:t>12/9/2019</a:t>
+              <a:t>12/9/19</a:t>
             </a:fld>
             <a:endParaRPr lang="en-US"/>
           </a:p>
@@ -1606,7 +1607,7 @@
           <a:p>
             <a:fld id="{99D86DFF-0522-4F85-932F-181CAB099252}" type="datetimeFigureOut">
               <a:rPr lang="en-US" smtClean="0"/>
-              <a:t>12/9/2019</a:t>
+              <a:t>12/9/19</a:t>
             </a:fld>
             <a:endParaRPr lang="en-US"/>
           </a:p>
@@ -1724,7 +1725,7 @@
           <a:p>
             <a:fld id="{99D86DFF-0522-4F85-932F-181CAB099252}" type="datetimeFigureOut">
               <a:rPr lang="en-US" smtClean="0"/>
-              <a:t>12/9/2019</a:t>
+              <a:t>12/9/19</a:t>
             </a:fld>
             <a:endParaRPr lang="en-US"/>
           </a:p>
@@ -1819,7 +1820,7 @@
           <a:p>
             <a:fld id="{99D86DFF-0522-4F85-932F-181CAB099252}" type="datetimeFigureOut">
               <a:rPr lang="en-US" smtClean="0"/>
-              <a:t>12/9/2019</a:t>
+              <a:t>12/9/19</a:t>
             </a:fld>
             <a:endParaRPr lang="en-US"/>
           </a:p>
@@ -2096,7 +2097,7 @@
           <a:p>
             <a:fld id="{99D86DFF-0522-4F85-932F-181CAB099252}" type="datetimeFigureOut">
               <a:rPr lang="en-US" smtClean="0"/>
-              <a:t>12/9/2019</a:t>
+              <a:t>12/9/19</a:t>
             </a:fld>
             <a:endParaRPr lang="en-US"/>
           </a:p>
@@ -2353,7 +2354,7 @@
           <a:p>
             <a:fld id="{99D86DFF-0522-4F85-932F-181CAB099252}" type="datetimeFigureOut">
               <a:rPr lang="en-US" smtClean="0"/>
-              <a:t>12/9/2019</a:t>
+              <a:t>12/9/19</a:t>
             </a:fld>
             <a:endParaRPr lang="en-US"/>
           </a:p>
@@ -2566,7 +2567,7 @@
           <a:p>
             <a:fld id="{99D86DFF-0522-4F85-932F-181CAB099252}" type="datetimeFigureOut">
               <a:rPr lang="en-US" smtClean="0"/>
-              <a:t>12/9/2019</a:t>
+              <a:t>12/9/19</a:t>
             </a:fld>
             <a:endParaRPr lang="en-US"/>
           </a:p>
@@ -3360,6 +3361,974 @@
 </p:sld>
 </file>
 
+<file path=ppt/slides/slide2.xml><?xml version="1.0" encoding="utf-8"?>
+<p:sld xmlns:a="http://schemas.openxmlformats.org/drawingml/2006/main" xmlns:r="http://schemas.openxmlformats.org/officeDocument/2006/relationships" xmlns:p="http://schemas.openxmlformats.org/presentationml/2006/main">
+  <p:cSld>
+    <p:spTree>
+      <p:nvGrpSpPr>
+        <p:cNvPr id="1" name=""/>
+        <p:cNvGrpSpPr/>
+        <p:nvPr/>
+      </p:nvGrpSpPr>
+      <p:grpSpPr>
+        <a:xfrm>
+          <a:off x="0" y="0"/>
+          <a:ext cx="0" cy="0"/>
+          <a:chOff x="0" y="0"/>
+          <a:chExt cx="0" cy="0"/>
+        </a:xfrm>
+      </p:grpSpPr>
+      <p:pic>
+        <p:nvPicPr>
+          <p:cNvPr id="606" name="Picture 605">
+            <a:extLst>
+              <a:ext uri="{FF2B5EF4-FFF2-40B4-BE49-F238E27FC236}">
+                <a16:creationId xmlns:a16="http://schemas.microsoft.com/office/drawing/2014/main" id="{4DC482B1-AED3-4917-A060-083F974FF377}"/>
+              </a:ext>
+            </a:extLst>
+          </p:cNvPr>
+          <p:cNvPicPr>
+            <a:picLocks noChangeAspect="1"/>
+          </p:cNvPicPr>
+          <p:nvPr/>
+        </p:nvPicPr>
+        <p:blipFill rotWithShape="1">
+          <a:blip r:embed="rId2"/>
+          <a:srcRect r="20510"/>
+          <a:stretch/>
+        </p:blipFill>
+        <p:spPr>
+          <a:xfrm>
+            <a:off x="-16625" y="136418"/>
+            <a:ext cx="3344026" cy="935452"/>
+          </a:xfrm>
+          <a:prstGeom prst="rect">
+            <a:avLst/>
+          </a:prstGeom>
+        </p:spPr>
+      </p:pic>
+      <p:sp>
+        <p:nvSpPr>
+          <p:cNvPr id="4" name="TextBox 3">
+            <a:extLst>
+              <a:ext uri="{FF2B5EF4-FFF2-40B4-BE49-F238E27FC236}">
+                <a16:creationId xmlns:a16="http://schemas.microsoft.com/office/drawing/2014/main" id="{0926D80B-480C-8442-8652-B6BE9C73815B}"/>
+              </a:ext>
+            </a:extLst>
+          </p:cNvPr>
+          <p:cNvSpPr txBox="1"/>
+          <p:nvPr/>
+        </p:nvSpPr>
+        <p:spPr>
+          <a:xfrm>
+            <a:off x="-16626" y="0"/>
+            <a:ext cx="317716" cy="369332"/>
+          </a:xfrm>
+          <a:prstGeom prst="rect">
+            <a:avLst/>
+          </a:prstGeom>
+          <a:noFill/>
+        </p:spPr>
+        <p:txBody>
+          <a:bodyPr wrap="none" rtlCol="0">
+            <a:spAutoFit/>
+          </a:bodyPr>
+          <a:lstStyle/>
+          <a:p>
+            <a:r>
+              <a:rPr lang="en-US" dirty="0"/>
+              <a:t>A</a:t>
+            </a:r>
+          </a:p>
+        </p:txBody>
+      </p:sp>
+      <p:sp>
+        <p:nvSpPr>
+          <p:cNvPr id="12" name="TextBox 11">
+            <a:extLst>
+              <a:ext uri="{FF2B5EF4-FFF2-40B4-BE49-F238E27FC236}">
+                <a16:creationId xmlns:a16="http://schemas.microsoft.com/office/drawing/2014/main" id="{18DEC879-570B-9F46-BF40-E31E4FA66A53}"/>
+              </a:ext>
+            </a:extLst>
+          </p:cNvPr>
+          <p:cNvSpPr txBox="1"/>
+          <p:nvPr/>
+        </p:nvSpPr>
+        <p:spPr>
+          <a:xfrm>
+            <a:off x="-59881" y="1125501"/>
+            <a:ext cx="317716" cy="369332"/>
+          </a:xfrm>
+          <a:prstGeom prst="rect">
+            <a:avLst/>
+          </a:prstGeom>
+          <a:noFill/>
+        </p:spPr>
+        <p:txBody>
+          <a:bodyPr wrap="none" rtlCol="0">
+            <a:spAutoFit/>
+          </a:bodyPr>
+          <a:lstStyle/>
+          <a:p>
+            <a:r>
+              <a:rPr lang="en-US" dirty="0"/>
+              <a:t>B</a:t>
+            </a:r>
+          </a:p>
+        </p:txBody>
+      </p:sp>
+      <p:grpSp>
+        <p:nvGrpSpPr>
+          <p:cNvPr id="579" name="Group 578">
+            <a:extLst>
+              <a:ext uri="{FF2B5EF4-FFF2-40B4-BE49-F238E27FC236}">
+                <a16:creationId xmlns:a16="http://schemas.microsoft.com/office/drawing/2014/main" id="{7D065024-E9F4-B74C-88D1-83268D61401D}"/>
+              </a:ext>
+            </a:extLst>
+          </p:cNvPr>
+          <p:cNvGrpSpPr>
+            <a:grpSpLocks noChangeAspect="1"/>
+          </p:cNvGrpSpPr>
+          <p:nvPr/>
+        </p:nvGrpSpPr>
+        <p:grpSpPr>
+          <a:xfrm>
+            <a:off x="3530780" y="496842"/>
+            <a:ext cx="349079" cy="349078"/>
+            <a:chOff x="10776317" y="15732952"/>
+            <a:chExt cx="585217" cy="585217"/>
+          </a:xfrm>
+        </p:grpSpPr>
+        <p:sp>
+          <p:nvSpPr>
+            <p:cNvPr id="137" name="Rectangle 136">
+              <a:extLst>
+                <a:ext uri="{FF2B5EF4-FFF2-40B4-BE49-F238E27FC236}">
+                  <a16:creationId xmlns:a16="http://schemas.microsoft.com/office/drawing/2014/main" id="{552E3499-72EA-0744-B304-921A5AC44A81}"/>
+                </a:ext>
+              </a:extLst>
+            </p:cNvPr>
+            <p:cNvSpPr/>
+            <p:nvPr/>
+          </p:nvSpPr>
+          <p:spPr>
+            <a:xfrm>
+              <a:off x="10776318" y="15732953"/>
+              <a:ext cx="585216" cy="585216"/>
+            </a:xfrm>
+            <a:prstGeom prst="rect">
+              <a:avLst/>
+            </a:prstGeom>
+            <a:solidFill>
+              <a:srgbClr val="4BAAC3"/>
+            </a:solidFill>
+            <a:ln w="28575" cap="flat" cmpd="sng" algn="ctr">
+              <a:solidFill>
+                <a:schemeClr val="dk1"/>
+              </a:solidFill>
+              <a:prstDash val="solid"/>
+              <a:round/>
+              <a:headEnd type="none" w="med" len="med"/>
+              <a:tailEnd type="none" w="med" len="med"/>
+            </a:ln>
+          </p:spPr>
+          <p:style>
+            <a:lnRef idx="0">
+              <a:scrgbClr r="0" g="0" b="0"/>
+            </a:lnRef>
+            <a:fillRef idx="0">
+              <a:scrgbClr r="0" g="0" b="0"/>
+            </a:fillRef>
+            <a:effectRef idx="0">
+              <a:scrgbClr r="0" g="0" b="0"/>
+            </a:effectRef>
+            <a:fontRef idx="minor">
+              <a:schemeClr val="dk1"/>
+            </a:fontRef>
+          </p:style>
+          <p:txBody>
+            <a:bodyPr rtlCol="0" anchor="ctr"/>
+            <a:lstStyle/>
+            <a:p>
+              <a:pPr algn="ctr"/>
+              <a:endParaRPr lang="en-US" sz="1800"/>
+            </a:p>
+          </p:txBody>
+        </p:sp>
+        <p:cxnSp>
+          <p:nvCxnSpPr>
+            <p:cNvPr id="138" name="Straight Connector 137">
+              <a:extLst>
+                <a:ext uri="{FF2B5EF4-FFF2-40B4-BE49-F238E27FC236}">
+                  <a16:creationId xmlns:a16="http://schemas.microsoft.com/office/drawing/2014/main" id="{70CDCDFF-B2FB-9841-937D-25AD77E9D7FE}"/>
+                </a:ext>
+              </a:extLst>
+            </p:cNvPr>
+            <p:cNvCxnSpPr>
+              <a:cxnSpLocks/>
+            </p:cNvCxnSpPr>
+            <p:nvPr/>
+          </p:nvCxnSpPr>
+          <p:spPr>
+            <a:xfrm>
+              <a:off x="10776317" y="15732952"/>
+              <a:ext cx="585216" cy="585216"/>
+            </a:xfrm>
+            <a:prstGeom prst="line">
+              <a:avLst/>
+            </a:prstGeom>
+            <a:ln w="28575"/>
+          </p:spPr>
+          <p:style>
+            <a:lnRef idx="1">
+              <a:schemeClr val="dk1"/>
+            </a:lnRef>
+            <a:fillRef idx="0">
+              <a:schemeClr val="dk1"/>
+            </a:fillRef>
+            <a:effectRef idx="0">
+              <a:schemeClr val="dk1"/>
+            </a:effectRef>
+            <a:fontRef idx="minor">
+              <a:schemeClr val="tx1"/>
+            </a:fontRef>
+          </p:style>
+        </p:cxnSp>
+      </p:grpSp>
+      <p:sp>
+        <p:nvSpPr>
+          <p:cNvPr id="580" name="TextBox 579">
+            <a:extLst>
+              <a:ext uri="{FF2B5EF4-FFF2-40B4-BE49-F238E27FC236}">
+                <a16:creationId xmlns:a16="http://schemas.microsoft.com/office/drawing/2014/main" id="{5259FEB9-E701-7C40-8756-0F6059155E6D}"/>
+              </a:ext>
+            </a:extLst>
+          </p:cNvPr>
+          <p:cNvSpPr txBox="1"/>
+          <p:nvPr/>
+        </p:nvSpPr>
+        <p:spPr>
+          <a:xfrm>
+            <a:off x="3246772" y="99568"/>
+            <a:ext cx="960103" cy="338554"/>
+          </a:xfrm>
+          <a:prstGeom prst="rect">
+            <a:avLst/>
+          </a:prstGeom>
+          <a:noFill/>
+        </p:spPr>
+        <p:txBody>
+          <a:bodyPr wrap="square" rtlCol="0">
+            <a:spAutoFit/>
+          </a:bodyPr>
+          <a:lstStyle/>
+          <a:p>
+            <a:pPr algn="ctr"/>
+            <a:r>
+              <a:rPr lang="en-US" sz="800" dirty="0">
+                <a:latin typeface="Helvetica" pitchFamily="2" charset="0"/>
+              </a:rPr>
+              <a:t>Fisher’s </a:t>
+            </a:r>
+            <a:br>
+              <a:rPr lang="en-US" sz="800" dirty="0">
+                <a:latin typeface="Helvetica" pitchFamily="2" charset="0"/>
+              </a:rPr>
+            </a:br>
+            <a:r>
+              <a:rPr lang="en-US" sz="800" dirty="0">
+                <a:latin typeface="Helvetica" pitchFamily="2" charset="0"/>
+              </a:rPr>
+              <a:t>Z-transformed</a:t>
+            </a:r>
+          </a:p>
+        </p:txBody>
+      </p:sp>
+      <p:sp>
+        <p:nvSpPr>
+          <p:cNvPr id="231" name="TextBox 230">
+            <a:extLst>
+              <a:ext uri="{FF2B5EF4-FFF2-40B4-BE49-F238E27FC236}">
+                <a16:creationId xmlns:a16="http://schemas.microsoft.com/office/drawing/2014/main" id="{51BCBB51-BB1E-6945-9AF0-22E68C191684}"/>
+              </a:ext>
+            </a:extLst>
+          </p:cNvPr>
+          <p:cNvSpPr txBox="1"/>
+          <p:nvPr/>
+        </p:nvSpPr>
+        <p:spPr>
+          <a:xfrm>
+            <a:off x="2367298" y="102862"/>
+            <a:ext cx="960103" cy="338554"/>
+          </a:xfrm>
+          <a:prstGeom prst="rect">
+            <a:avLst/>
+          </a:prstGeom>
+          <a:solidFill>
+            <a:schemeClr val="bg1"/>
+          </a:solidFill>
+        </p:spPr>
+        <p:txBody>
+          <a:bodyPr wrap="square" rtlCol="0">
+            <a:spAutoFit/>
+          </a:bodyPr>
+          <a:lstStyle/>
+          <a:p>
+            <a:pPr algn="ctr"/>
+            <a:r>
+              <a:rPr lang="en-US" sz="800" dirty="0">
+                <a:latin typeface="Helvetica" pitchFamily="2" charset="0"/>
+              </a:rPr>
+              <a:t>Cross correlation between parcels</a:t>
+            </a:r>
+          </a:p>
+        </p:txBody>
+      </p:sp>
+      <p:sp>
+        <p:nvSpPr>
+          <p:cNvPr id="232" name="TextBox 231">
+            <a:extLst>
+              <a:ext uri="{FF2B5EF4-FFF2-40B4-BE49-F238E27FC236}">
+                <a16:creationId xmlns:a16="http://schemas.microsoft.com/office/drawing/2014/main" id="{CCAE5A89-F9E5-DE43-9924-FE41B490FA82}"/>
+              </a:ext>
+            </a:extLst>
+          </p:cNvPr>
+          <p:cNvSpPr txBox="1"/>
+          <p:nvPr/>
+        </p:nvSpPr>
+        <p:spPr>
+          <a:xfrm>
+            <a:off x="984082" y="105562"/>
+            <a:ext cx="1383215" cy="338554"/>
+          </a:xfrm>
+          <a:prstGeom prst="rect">
+            <a:avLst/>
+          </a:prstGeom>
+          <a:solidFill>
+            <a:schemeClr val="bg1"/>
+          </a:solidFill>
+        </p:spPr>
+        <p:txBody>
+          <a:bodyPr wrap="square" rtlCol="0">
+            <a:spAutoFit/>
+          </a:bodyPr>
+          <a:lstStyle/>
+          <a:p>
+            <a:pPr algn="ctr"/>
+            <a:r>
+              <a:rPr lang="en-US" sz="800" dirty="0">
+                <a:latin typeface="Helvetica" pitchFamily="2" charset="0"/>
+              </a:rPr>
+              <a:t>Parcel’s mean time series during resting-state scan</a:t>
+            </a:r>
+          </a:p>
+        </p:txBody>
+      </p:sp>
+      <p:pic>
+        <p:nvPicPr>
+          <p:cNvPr id="581" name="Picture 580">
+            <a:extLst>
+              <a:ext uri="{FF2B5EF4-FFF2-40B4-BE49-F238E27FC236}">
+                <a16:creationId xmlns:a16="http://schemas.microsoft.com/office/drawing/2014/main" id="{16E8B42E-EC9A-334A-8662-99FEDCDA6C6C}"/>
+              </a:ext>
+            </a:extLst>
+          </p:cNvPr>
+          <p:cNvPicPr>
+            <a:picLocks noChangeAspect="1"/>
+          </p:cNvPicPr>
+          <p:nvPr/>
+        </p:nvPicPr>
+        <p:blipFill>
+          <a:blip r:embed="rId3"/>
+          <a:stretch>
+            <a:fillRect/>
+          </a:stretch>
+        </p:blipFill>
+        <p:spPr>
+          <a:xfrm>
+            <a:off x="48215" y="1309889"/>
+            <a:ext cx="4009506" cy="1766756"/>
+          </a:xfrm>
+          <a:prstGeom prst="rect">
+            <a:avLst/>
+          </a:prstGeom>
+        </p:spPr>
+      </p:pic>
+      <p:grpSp>
+        <p:nvGrpSpPr>
+          <p:cNvPr id="588" name="Group 587">
+            <a:extLst>
+              <a:ext uri="{FF2B5EF4-FFF2-40B4-BE49-F238E27FC236}">
+                <a16:creationId xmlns:a16="http://schemas.microsoft.com/office/drawing/2014/main" id="{E665BBED-5A89-344D-9E96-22EBF403C692}"/>
+              </a:ext>
+            </a:extLst>
+          </p:cNvPr>
+          <p:cNvGrpSpPr/>
+          <p:nvPr/>
+        </p:nvGrpSpPr>
+        <p:grpSpPr>
+          <a:xfrm>
+            <a:off x="0" y="3314664"/>
+            <a:ext cx="4215734" cy="1544565"/>
+            <a:chOff x="-59881" y="3477505"/>
+            <a:chExt cx="4215734" cy="1544565"/>
+          </a:xfrm>
+        </p:grpSpPr>
+        <p:sp>
+          <p:nvSpPr>
+            <p:cNvPr id="236" name="TextBox 235">
+              <a:extLst>
+                <a:ext uri="{FF2B5EF4-FFF2-40B4-BE49-F238E27FC236}">
+                  <a16:creationId xmlns:a16="http://schemas.microsoft.com/office/drawing/2014/main" id="{2088A7FD-8328-7E42-94D4-C10D5946CE49}"/>
+                </a:ext>
+              </a:extLst>
+            </p:cNvPr>
+            <p:cNvSpPr txBox="1"/>
+            <p:nvPr/>
+          </p:nvSpPr>
+          <p:spPr>
+            <a:xfrm>
+              <a:off x="-59881" y="3477505"/>
+              <a:ext cx="317716" cy="369332"/>
+            </a:xfrm>
+            <a:prstGeom prst="rect">
+              <a:avLst/>
+            </a:prstGeom>
+            <a:noFill/>
+          </p:spPr>
+          <p:txBody>
+            <a:bodyPr wrap="none" rtlCol="0">
+              <a:spAutoFit/>
+            </a:bodyPr>
+            <a:lstStyle/>
+            <a:p>
+              <a:r>
+                <a:rPr lang="en-US" dirty="0"/>
+                <a:t>C</a:t>
+              </a:r>
+            </a:p>
+          </p:txBody>
+        </p:sp>
+        <p:pic>
+          <p:nvPicPr>
+            <p:cNvPr id="237" name="Picture 236">
+              <a:extLst>
+                <a:ext uri="{FF2B5EF4-FFF2-40B4-BE49-F238E27FC236}">
+                  <a16:creationId xmlns:a16="http://schemas.microsoft.com/office/drawing/2014/main" id="{C391D5D7-CA18-894C-A92C-64C077AED3AF}"/>
+                </a:ext>
+              </a:extLst>
+            </p:cNvPr>
+            <p:cNvPicPr>
+              <a:picLocks noChangeAspect="1"/>
+            </p:cNvPicPr>
+            <p:nvPr/>
+          </p:nvPicPr>
+          <p:blipFill rotWithShape="1">
+            <a:blip r:embed="rId3"/>
+            <a:srcRect l="15742" t="11839" r="790" b="63769"/>
+            <a:stretch/>
+          </p:blipFill>
+          <p:spPr>
+            <a:xfrm>
+              <a:off x="15257" y="3779183"/>
+              <a:ext cx="3511375" cy="452170"/>
+            </a:xfrm>
+            <a:prstGeom prst="rect">
+              <a:avLst/>
+            </a:prstGeom>
+          </p:spPr>
+        </p:pic>
+        <p:sp>
+          <p:nvSpPr>
+            <p:cNvPr id="583" name="Right Brace 582">
+              <a:extLst>
+                <a:ext uri="{FF2B5EF4-FFF2-40B4-BE49-F238E27FC236}">
+                  <a16:creationId xmlns:a16="http://schemas.microsoft.com/office/drawing/2014/main" id="{C12B441D-2F36-A047-A49D-A6A424AD351F}"/>
+                </a:ext>
+              </a:extLst>
+            </p:cNvPr>
+            <p:cNvSpPr/>
+            <p:nvPr/>
+          </p:nvSpPr>
+          <p:spPr>
+            <a:xfrm rot="5400000" flipV="1">
+              <a:off x="816896" y="3977807"/>
+              <a:ext cx="93214" cy="582562"/>
+            </a:xfrm>
+            <a:prstGeom prst="rightBrace">
+              <a:avLst/>
+            </a:prstGeom>
+            <a:ln w="19050">
+              <a:solidFill>
+                <a:schemeClr val="tx1"/>
+              </a:solidFill>
+            </a:ln>
+          </p:spPr>
+          <p:style>
+            <a:lnRef idx="1">
+              <a:schemeClr val="accent1"/>
+            </a:lnRef>
+            <a:fillRef idx="0">
+              <a:schemeClr val="accent1"/>
+            </a:fillRef>
+            <a:effectRef idx="0">
+              <a:schemeClr val="accent1"/>
+            </a:effectRef>
+            <a:fontRef idx="minor">
+              <a:schemeClr val="tx1"/>
+            </a:fontRef>
+          </p:style>
+          <p:txBody>
+            <a:bodyPr rtlCol="0" anchor="ctr"/>
+            <a:lstStyle/>
+            <a:p>
+              <a:pPr algn="ctr"/>
+              <a:endParaRPr lang="en-US"/>
+            </a:p>
+          </p:txBody>
+        </p:sp>
+        <p:sp>
+          <p:nvSpPr>
+            <p:cNvPr id="239" name="Right Brace 238">
+              <a:extLst>
+                <a:ext uri="{FF2B5EF4-FFF2-40B4-BE49-F238E27FC236}">
+                  <a16:creationId xmlns:a16="http://schemas.microsoft.com/office/drawing/2014/main" id="{ECEFE9FD-2D7F-F443-B574-969563D8AE57}"/>
+                </a:ext>
+              </a:extLst>
+            </p:cNvPr>
+            <p:cNvSpPr/>
+            <p:nvPr/>
+          </p:nvSpPr>
+          <p:spPr>
+            <a:xfrm rot="5400000" flipV="1">
+              <a:off x="576140" y="4569447"/>
+              <a:ext cx="110152" cy="117986"/>
+            </a:xfrm>
+            <a:prstGeom prst="rightBrace">
+              <a:avLst/>
+            </a:prstGeom>
+            <a:ln w="19050">
+              <a:solidFill>
+                <a:schemeClr val="tx1"/>
+              </a:solidFill>
+            </a:ln>
+          </p:spPr>
+          <p:style>
+            <a:lnRef idx="1">
+              <a:schemeClr val="accent1"/>
+            </a:lnRef>
+            <a:fillRef idx="0">
+              <a:schemeClr val="accent1"/>
+            </a:fillRef>
+            <a:effectRef idx="0">
+              <a:schemeClr val="accent1"/>
+            </a:effectRef>
+            <a:fontRef idx="minor">
+              <a:schemeClr val="tx1"/>
+            </a:fontRef>
+          </p:style>
+          <p:txBody>
+            <a:bodyPr rtlCol="0" anchor="ctr"/>
+            <a:lstStyle/>
+            <a:p>
+              <a:pPr algn="ctr"/>
+              <a:endParaRPr lang="en-US"/>
+            </a:p>
+          </p:txBody>
+        </p:sp>
+        <p:sp>
+          <p:nvSpPr>
+            <p:cNvPr id="242" name="Right Brace 241">
+              <a:extLst>
+                <a:ext uri="{FF2B5EF4-FFF2-40B4-BE49-F238E27FC236}">
+                  <a16:creationId xmlns:a16="http://schemas.microsoft.com/office/drawing/2014/main" id="{B38A69CF-773D-874E-B9F8-6B3770E99C26}"/>
+                </a:ext>
+              </a:extLst>
+            </p:cNvPr>
+            <p:cNvSpPr/>
+            <p:nvPr/>
+          </p:nvSpPr>
+          <p:spPr>
+            <a:xfrm rot="5400000" flipV="1">
+              <a:off x="885431" y="4413068"/>
+              <a:ext cx="101681" cy="422276"/>
+            </a:xfrm>
+            <a:prstGeom prst="rightBrace">
+              <a:avLst/>
+            </a:prstGeom>
+            <a:ln w="19050">
+              <a:solidFill>
+                <a:schemeClr val="tx1"/>
+              </a:solidFill>
+            </a:ln>
+          </p:spPr>
+          <p:style>
+            <a:lnRef idx="1">
+              <a:schemeClr val="accent1"/>
+            </a:lnRef>
+            <a:fillRef idx="0">
+              <a:schemeClr val="accent1"/>
+            </a:fillRef>
+            <a:effectRef idx="0">
+              <a:schemeClr val="accent1"/>
+            </a:effectRef>
+            <a:fontRef idx="minor">
+              <a:schemeClr val="tx1"/>
+            </a:fontRef>
+          </p:style>
+          <p:txBody>
+            <a:bodyPr rtlCol="0" anchor="ctr"/>
+            <a:lstStyle/>
+            <a:p>
+              <a:pPr algn="ctr"/>
+              <a:endParaRPr lang="en-US"/>
+            </a:p>
+          </p:txBody>
+        </p:sp>
+        <p:sp>
+          <p:nvSpPr>
+            <p:cNvPr id="243" name="TextBox 242">
+              <a:extLst>
+                <a:ext uri="{FF2B5EF4-FFF2-40B4-BE49-F238E27FC236}">
+                  <a16:creationId xmlns:a16="http://schemas.microsoft.com/office/drawing/2014/main" id="{BCD6DDF4-6E2B-0849-AB58-999D073B2F36}"/>
+                </a:ext>
+              </a:extLst>
+            </p:cNvPr>
+            <p:cNvSpPr txBox="1"/>
+            <p:nvPr/>
+          </p:nvSpPr>
+          <p:spPr>
+            <a:xfrm>
+              <a:off x="383451" y="4315695"/>
+              <a:ext cx="960103" cy="215444"/>
+            </a:xfrm>
+            <a:prstGeom prst="rect">
+              <a:avLst/>
+            </a:prstGeom>
+            <a:noFill/>
+          </p:spPr>
+          <p:txBody>
+            <a:bodyPr wrap="square" rtlCol="0">
+              <a:spAutoFit/>
+            </a:bodyPr>
+            <a:lstStyle/>
+            <a:p>
+              <a:pPr algn="ctr"/>
+              <a:r>
+                <a:rPr lang="en-US" sz="800" dirty="0">
+                  <a:latin typeface="Helvetica" pitchFamily="2" charset="0"/>
+                </a:rPr>
+                <a:t>➗ 𝛿</a:t>
+              </a:r>
+              <a:r>
+                <a:rPr lang="en-US" sz="800" baseline="-25000" dirty="0">
+                  <a:latin typeface="Helvetica" pitchFamily="2" charset="0"/>
+                </a:rPr>
+                <a:t>1</a:t>
+              </a:r>
+              <a:endParaRPr lang="en-US" sz="800" dirty="0">
+                <a:latin typeface="Helvetica" pitchFamily="2" charset="0"/>
+              </a:endParaRPr>
+            </a:p>
+          </p:txBody>
+        </p:sp>
+        <p:sp>
+          <p:nvSpPr>
+            <p:cNvPr id="245" name="TextBox 244">
+              <a:extLst>
+                <a:ext uri="{FF2B5EF4-FFF2-40B4-BE49-F238E27FC236}">
+                  <a16:creationId xmlns:a16="http://schemas.microsoft.com/office/drawing/2014/main" id="{96683769-7AA9-444F-BFBC-F54A0DAA2F88}"/>
+                </a:ext>
+              </a:extLst>
+            </p:cNvPr>
+            <p:cNvSpPr txBox="1"/>
+            <p:nvPr/>
+          </p:nvSpPr>
+          <p:spPr>
+            <a:xfrm>
+              <a:off x="336271" y="4683516"/>
+              <a:ext cx="498119" cy="215444"/>
+            </a:xfrm>
+            <a:prstGeom prst="rect">
+              <a:avLst/>
+            </a:prstGeom>
+            <a:noFill/>
+          </p:spPr>
+          <p:txBody>
+            <a:bodyPr wrap="square" rtlCol="0">
+              <a:spAutoFit/>
+            </a:bodyPr>
+            <a:lstStyle/>
+            <a:p>
+              <a:pPr algn="ctr"/>
+              <a:r>
+                <a:rPr lang="en-US" sz="800" dirty="0">
+                  <a:latin typeface="Helvetica" pitchFamily="2" charset="0"/>
+                </a:rPr>
+                <a:t>➗ 𝛿’</a:t>
+              </a:r>
+              <a:r>
+                <a:rPr lang="en-US" sz="800" baseline="-25000" dirty="0">
+                  <a:latin typeface="Helvetica" pitchFamily="2" charset="0"/>
+                </a:rPr>
+                <a:t>1</a:t>
+              </a:r>
+              <a:endParaRPr lang="en-US" sz="800" dirty="0">
+                <a:latin typeface="Helvetica" pitchFamily="2" charset="0"/>
+              </a:endParaRPr>
+            </a:p>
+          </p:txBody>
+        </p:sp>
+        <p:sp>
+          <p:nvSpPr>
+            <p:cNvPr id="246" name="TextBox 245">
+              <a:extLst>
+                <a:ext uri="{FF2B5EF4-FFF2-40B4-BE49-F238E27FC236}">
+                  <a16:creationId xmlns:a16="http://schemas.microsoft.com/office/drawing/2014/main" id="{DEB9BAB4-7766-CD45-89D9-06F0C4BC8F1A}"/>
+                </a:ext>
+              </a:extLst>
+            </p:cNvPr>
+            <p:cNvSpPr txBox="1"/>
+            <p:nvPr/>
+          </p:nvSpPr>
+          <p:spPr>
+            <a:xfrm>
+              <a:off x="723487" y="4683516"/>
+              <a:ext cx="556361" cy="338554"/>
+            </a:xfrm>
+            <a:prstGeom prst="rect">
+              <a:avLst/>
+            </a:prstGeom>
+            <a:noFill/>
+          </p:spPr>
+          <p:txBody>
+            <a:bodyPr wrap="square" rtlCol="0">
+              <a:spAutoFit/>
+            </a:bodyPr>
+            <a:lstStyle/>
+            <a:p>
+              <a:pPr algn="ctr"/>
+              <a:r>
+                <a:rPr lang="en-US" sz="800" dirty="0">
+                  <a:latin typeface="Helvetica" pitchFamily="2" charset="0"/>
+                </a:rPr>
+                <a:t>➗ 𝛿’</a:t>
+              </a:r>
+              <a:r>
+                <a:rPr lang="en-US" sz="800" baseline="-25000" dirty="0">
+                  <a:latin typeface="Helvetica" pitchFamily="2" charset="0"/>
+                </a:rPr>
+                <a:t>1</a:t>
+              </a:r>
+            </a:p>
+            <a:p>
+              <a:pPr algn="ctr"/>
+              <a:endParaRPr lang="en-US" sz="800" dirty="0">
+                <a:latin typeface="Helvetica" pitchFamily="2" charset="0"/>
+              </a:endParaRPr>
+            </a:p>
+          </p:txBody>
+        </p:sp>
+        <p:sp>
+          <p:nvSpPr>
+            <p:cNvPr id="584" name="TextBox 583">
+              <a:extLst>
+                <a:ext uri="{FF2B5EF4-FFF2-40B4-BE49-F238E27FC236}">
+                  <a16:creationId xmlns:a16="http://schemas.microsoft.com/office/drawing/2014/main" id="{E664578D-4810-4D4B-8E3B-F5DFAFC05466}"/>
+                </a:ext>
+              </a:extLst>
+            </p:cNvPr>
+            <p:cNvSpPr txBox="1"/>
+            <p:nvPr/>
+          </p:nvSpPr>
+          <p:spPr>
+            <a:xfrm>
+              <a:off x="1062066" y="4644889"/>
+              <a:ext cx="2995655" cy="215444"/>
+            </a:xfrm>
+            <a:prstGeom prst="rect">
+              <a:avLst/>
+            </a:prstGeom>
+            <a:noFill/>
+          </p:spPr>
+          <p:txBody>
+            <a:bodyPr wrap="square" rtlCol="0">
+              <a:spAutoFit/>
+            </a:bodyPr>
+            <a:lstStyle/>
+            <a:p>
+              <a:r>
+                <a:rPr lang="en-US" sz="800" dirty="0">
+                  <a:latin typeface="Helvetica" pitchFamily="2" charset="0"/>
+                  <a:cs typeface="Arial" panose="020B0604020202020204" pitchFamily="34" charset="0"/>
+                </a:rPr>
+                <a:t>Normalize between/within edge block by its first singular value</a:t>
+              </a:r>
+              <a:endParaRPr lang="en-US" sz="800" dirty="0">
+                <a:latin typeface="Helvetica" pitchFamily="2" charset="0"/>
+              </a:endParaRPr>
+            </a:p>
+          </p:txBody>
+        </p:sp>
+        <p:sp>
+          <p:nvSpPr>
+            <p:cNvPr id="248" name="TextBox 247">
+              <a:extLst>
+                <a:ext uri="{FF2B5EF4-FFF2-40B4-BE49-F238E27FC236}">
+                  <a16:creationId xmlns:a16="http://schemas.microsoft.com/office/drawing/2014/main" id="{6E841B46-9E27-AD4B-8047-3A967E286D11}"/>
+                </a:ext>
+              </a:extLst>
+            </p:cNvPr>
+            <p:cNvSpPr txBox="1"/>
+            <p:nvPr/>
+          </p:nvSpPr>
+          <p:spPr>
+            <a:xfrm>
+              <a:off x="1062065" y="4338580"/>
+              <a:ext cx="3081000" cy="215444"/>
+            </a:xfrm>
+            <a:prstGeom prst="rect">
+              <a:avLst/>
+            </a:prstGeom>
+            <a:noFill/>
+          </p:spPr>
+          <p:txBody>
+            <a:bodyPr wrap="square" rtlCol="0">
+              <a:spAutoFit/>
+            </a:bodyPr>
+            <a:lstStyle/>
+            <a:p>
+              <a:r>
+                <a:rPr lang="en-US" sz="800" dirty="0">
+                  <a:latin typeface="Helvetica" pitchFamily="2" charset="0"/>
+                  <a:cs typeface="Arial" panose="020B0604020202020204" pitchFamily="34" charset="0"/>
+                </a:rPr>
+                <a:t>Normalize subject block by its first singular value, and then…</a:t>
+              </a:r>
+              <a:endParaRPr lang="en-US" sz="800" dirty="0">
+                <a:latin typeface="Helvetica" pitchFamily="2" charset="0"/>
+              </a:endParaRPr>
+            </a:p>
+          </p:txBody>
+        </p:sp>
+        <p:sp>
+          <p:nvSpPr>
+            <p:cNvPr id="254" name="Rectangle 253">
+              <a:extLst>
+                <a:ext uri="{FF2B5EF4-FFF2-40B4-BE49-F238E27FC236}">
+                  <a16:creationId xmlns:a16="http://schemas.microsoft.com/office/drawing/2014/main" id="{3BC05A17-00BE-AA4A-8778-64D9BD08C3A0}"/>
+                </a:ext>
+              </a:extLst>
+            </p:cNvPr>
+            <p:cNvSpPr/>
+            <p:nvPr/>
+          </p:nvSpPr>
+          <p:spPr>
+            <a:xfrm>
+              <a:off x="3601770" y="3882580"/>
+              <a:ext cx="554083" cy="216621"/>
+            </a:xfrm>
+            <a:prstGeom prst="rect">
+              <a:avLst/>
+            </a:prstGeom>
+            <a:noFill/>
+            <a:ln>
+              <a:noFill/>
+            </a:ln>
+          </p:spPr>
+          <p:style>
+            <a:lnRef idx="2">
+              <a:schemeClr val="accent1">
+                <a:shade val="50000"/>
+              </a:schemeClr>
+            </a:lnRef>
+            <a:fillRef idx="1">
+              <a:schemeClr val="accent1"/>
+            </a:fillRef>
+            <a:effectRef idx="0">
+              <a:schemeClr val="accent1"/>
+            </a:effectRef>
+            <a:fontRef idx="minor">
+              <a:schemeClr val="lt1"/>
+            </a:fontRef>
+          </p:style>
+          <p:txBody>
+            <a:bodyPr rtlCol="0" anchor="ctr"/>
+            <a:lstStyle/>
+            <a:p>
+              <a:pPr algn="ctr"/>
+              <a:r>
+                <a:rPr lang="en-US" sz="900" dirty="0">
+                  <a:solidFill>
+                    <a:schemeClr val="tx1"/>
+                  </a:solidFill>
+                  <a:latin typeface="Helvetica" pitchFamily="2" charset="0"/>
+                </a:rPr>
+                <a:t>PCA</a:t>
+              </a:r>
+            </a:p>
+          </p:txBody>
+        </p:sp>
+        <p:sp>
+          <p:nvSpPr>
+            <p:cNvPr id="256" name="Arrow: Down 764">
+              <a:extLst>
+                <a:ext uri="{FF2B5EF4-FFF2-40B4-BE49-F238E27FC236}">
+                  <a16:creationId xmlns:a16="http://schemas.microsoft.com/office/drawing/2014/main" id="{51EBF1AC-7015-0740-B85B-1F4C0F0EDD50}"/>
+                </a:ext>
+              </a:extLst>
+            </p:cNvPr>
+            <p:cNvSpPr/>
+            <p:nvPr/>
+          </p:nvSpPr>
+          <p:spPr>
+            <a:xfrm rot="16200000">
+              <a:off x="3523302" y="3929154"/>
+              <a:ext cx="137631" cy="130970"/>
+            </a:xfrm>
+            <a:prstGeom prst="downArrow">
+              <a:avLst/>
+            </a:prstGeom>
+          </p:spPr>
+          <p:style>
+            <a:lnRef idx="2">
+              <a:schemeClr val="dk1">
+                <a:shade val="50000"/>
+              </a:schemeClr>
+            </a:lnRef>
+            <a:fillRef idx="1">
+              <a:schemeClr val="dk1"/>
+            </a:fillRef>
+            <a:effectRef idx="0">
+              <a:schemeClr val="dk1"/>
+            </a:effectRef>
+            <a:fontRef idx="minor">
+              <a:schemeClr val="lt1"/>
+            </a:fontRef>
+          </p:style>
+          <p:txBody>
+            <a:bodyPr rtlCol="0" anchor="ctr"/>
+            <a:lstStyle/>
+            <a:p>
+              <a:pPr algn="ctr"/>
+              <a:endParaRPr lang="en-US"/>
+            </a:p>
+          </p:txBody>
+        </p:sp>
+      </p:grpSp>
+    </p:spTree>
+    <p:extLst>
+      <p:ext uri="{BB962C8B-B14F-4D97-AF65-F5344CB8AC3E}">
+        <p14:creationId xmlns:p14="http://schemas.microsoft.com/office/powerpoint/2010/main" val="3881154148"/>
+      </p:ext>
+    </p:extLst>
+  </p:cSld>
+  <p:clrMapOvr>
+    <a:masterClrMapping/>
+  </p:clrMapOvr>
+</p:sld>
+</file>
+
 <file path=ppt/theme/theme1.xml><?xml version="1.0" encoding="utf-8"?>
 <a:theme xmlns:a="http://schemas.openxmlformats.org/drawingml/2006/main" name="Office Theme">
   <a:themeElements>

</xml_diff>

<commit_message>
Fix references and Figure 1
</commit_message>
<xml_diff>
--- a/presentation/OHBM2020/Figure1.pptx
+++ b/presentation/OHBM2020/Figure1.pptx
@@ -244,7 +244,7 @@
           <a:p>
             <a:fld id="{99D86DFF-0522-4F85-932F-181CAB099252}" type="datetimeFigureOut">
               <a:rPr lang="en-US" smtClean="0"/>
-              <a:t>12/9/19</a:t>
+              <a:t>12/10/2019</a:t>
             </a:fld>
             <a:endParaRPr lang="en-US"/>
           </a:p>
@@ -414,7 +414,7 @@
           <a:p>
             <a:fld id="{99D86DFF-0522-4F85-932F-181CAB099252}" type="datetimeFigureOut">
               <a:rPr lang="en-US" smtClean="0"/>
-              <a:t>12/9/19</a:t>
+              <a:t>12/10/2019</a:t>
             </a:fld>
             <a:endParaRPr lang="en-US"/>
           </a:p>
@@ -594,7 +594,7 @@
           <a:p>
             <a:fld id="{99D86DFF-0522-4F85-932F-181CAB099252}" type="datetimeFigureOut">
               <a:rPr lang="en-US" smtClean="0"/>
-              <a:t>12/9/19</a:t>
+              <a:t>12/10/2019</a:t>
             </a:fld>
             <a:endParaRPr lang="en-US"/>
           </a:p>
@@ -764,7 +764,7 @@
           <a:p>
             <a:fld id="{99D86DFF-0522-4F85-932F-181CAB099252}" type="datetimeFigureOut">
               <a:rPr lang="en-US" smtClean="0"/>
-              <a:t>12/9/19</a:t>
+              <a:t>12/10/2019</a:t>
             </a:fld>
             <a:endParaRPr lang="en-US"/>
           </a:p>
@@ -1008,7 +1008,7 @@
           <a:p>
             <a:fld id="{99D86DFF-0522-4F85-932F-181CAB099252}" type="datetimeFigureOut">
               <a:rPr lang="en-US" smtClean="0"/>
-              <a:t>12/9/19</a:t>
+              <a:t>12/10/2019</a:t>
             </a:fld>
             <a:endParaRPr lang="en-US"/>
           </a:p>
@@ -1240,7 +1240,7 @@
           <a:p>
             <a:fld id="{99D86DFF-0522-4F85-932F-181CAB099252}" type="datetimeFigureOut">
               <a:rPr lang="en-US" smtClean="0"/>
-              <a:t>12/9/19</a:t>
+              <a:t>12/10/2019</a:t>
             </a:fld>
             <a:endParaRPr lang="en-US"/>
           </a:p>
@@ -1607,7 +1607,7 @@
           <a:p>
             <a:fld id="{99D86DFF-0522-4F85-932F-181CAB099252}" type="datetimeFigureOut">
               <a:rPr lang="en-US" smtClean="0"/>
-              <a:t>12/9/19</a:t>
+              <a:t>12/10/2019</a:t>
             </a:fld>
             <a:endParaRPr lang="en-US"/>
           </a:p>
@@ -1725,7 +1725,7 @@
           <a:p>
             <a:fld id="{99D86DFF-0522-4F85-932F-181CAB099252}" type="datetimeFigureOut">
               <a:rPr lang="en-US" smtClean="0"/>
-              <a:t>12/9/19</a:t>
+              <a:t>12/10/2019</a:t>
             </a:fld>
             <a:endParaRPr lang="en-US"/>
           </a:p>
@@ -1820,7 +1820,7 @@
           <a:p>
             <a:fld id="{99D86DFF-0522-4F85-932F-181CAB099252}" type="datetimeFigureOut">
               <a:rPr lang="en-US" smtClean="0"/>
-              <a:t>12/9/19</a:t>
+              <a:t>12/10/2019</a:t>
             </a:fld>
             <a:endParaRPr lang="en-US"/>
           </a:p>
@@ -2097,7 +2097,7 @@
           <a:p>
             <a:fld id="{99D86DFF-0522-4F85-932F-181CAB099252}" type="datetimeFigureOut">
               <a:rPr lang="en-US" smtClean="0"/>
-              <a:t>12/9/19</a:t>
+              <a:t>12/10/2019</a:t>
             </a:fld>
             <a:endParaRPr lang="en-US"/>
           </a:p>
@@ -2354,7 +2354,7 @@
           <a:p>
             <a:fld id="{99D86DFF-0522-4F85-932F-181CAB099252}" type="datetimeFigureOut">
               <a:rPr lang="en-US" smtClean="0"/>
-              <a:t>12/9/19</a:t>
+              <a:t>12/10/2019</a:t>
             </a:fld>
             <a:endParaRPr lang="en-US"/>
           </a:p>
@@ -2567,7 +2567,7 @@
           <a:p>
             <a:fld id="{99D86DFF-0522-4F85-932F-181CAB099252}" type="datetimeFigureOut">
               <a:rPr lang="en-US" smtClean="0"/>
-              <a:t>12/9/19</a:t>
+              <a:t>12/10/2019</a:t>
             </a:fld>
             <a:endParaRPr lang="en-US"/>
           </a:p>
@@ -3421,8 +3421,8 @@
         </p:nvSpPr>
         <p:spPr>
           <a:xfrm>
-            <a:off x="-16626" y="0"/>
-            <a:ext cx="317716" cy="369332"/>
+            <a:off x="-29941" y="0"/>
+            <a:ext cx="351378" cy="369332"/>
           </a:xfrm>
           <a:prstGeom prst="rect">
             <a:avLst/>
@@ -3436,7 +3436,10 @@
           <a:lstStyle/>
           <a:p>
             <a:r>
-              <a:rPr lang="en-US" dirty="0"/>
+              <a:rPr lang="en-US" b="1" dirty="0">
+                <a:latin typeface="Arial" panose="020B0604020202020204" pitchFamily="34" charset="0"/>
+                <a:cs typeface="Arial" panose="020B0604020202020204" pitchFamily="34" charset="0"/>
+              </a:rPr>
               <a:t>A</a:t>
             </a:r>
           </a:p>
@@ -3456,8 +3459,8 @@
         </p:nvSpPr>
         <p:spPr>
           <a:xfrm>
-            <a:off x="-59881" y="1125501"/>
-            <a:ext cx="317716" cy="369332"/>
+            <a:off x="-29941" y="1318001"/>
+            <a:ext cx="351378" cy="369332"/>
           </a:xfrm>
           <a:prstGeom prst="rect">
             <a:avLst/>
@@ -3471,7 +3474,10 @@
           <a:lstStyle/>
           <a:p>
             <a:r>
-              <a:rPr lang="en-US" dirty="0"/>
+              <a:rPr lang="en-US" b="1" dirty="0">
+                <a:latin typeface="Arial" panose="020B0604020202020204" pitchFamily="34" charset="0"/>
+                <a:cs typeface="Arial" panose="020B0604020202020204" pitchFamily="34" charset="0"/>
+              </a:rPr>
               <a:t>B</a:t>
             </a:r>
           </a:p>
@@ -3724,42 +3730,50 @@
           </a:p>
         </p:txBody>
       </p:sp>
-      <p:pic>
-        <p:nvPicPr>
-          <p:cNvPr id="581" name="Picture 580">
+      <p:sp>
+        <p:nvSpPr>
+          <p:cNvPr id="236" name="TextBox 235">
             <a:extLst>
               <a:ext uri="{FF2B5EF4-FFF2-40B4-BE49-F238E27FC236}">
-                <a16:creationId xmlns:a16="http://schemas.microsoft.com/office/drawing/2014/main" id="{16E8B42E-EC9A-334A-8662-99FEDCDA6C6C}"/>
+                <a16:creationId xmlns:a16="http://schemas.microsoft.com/office/drawing/2014/main" id="{2088A7FD-8328-7E42-94D4-C10D5946CE49}"/>
               </a:ext>
             </a:extLst>
           </p:cNvPr>
-          <p:cNvPicPr>
-            <a:picLocks noChangeAspect="1"/>
-          </p:cNvPicPr>
+          <p:cNvSpPr txBox="1"/>
           <p:nvPr/>
-        </p:nvPicPr>
-        <p:blipFill>
-          <a:blip r:embed="rId3"/>
-          <a:stretch>
-            <a:fillRect/>
-          </a:stretch>
-        </p:blipFill>
+        </p:nvSpPr>
         <p:spPr>
           <a:xfrm>
-            <a:off x="48215" y="1309889"/>
-            <a:ext cx="4009506" cy="1766756"/>
+            <a:off x="-29941" y="3424668"/>
+            <a:ext cx="351378" cy="369332"/>
           </a:xfrm>
           <a:prstGeom prst="rect">
             <a:avLst/>
           </a:prstGeom>
+          <a:noFill/>
         </p:spPr>
-      </p:pic>
+        <p:txBody>
+          <a:bodyPr wrap="none" rtlCol="0">
+            <a:spAutoFit/>
+          </a:bodyPr>
+          <a:lstStyle/>
+          <a:p>
+            <a:r>
+              <a:rPr lang="en-US" b="1" dirty="0">
+                <a:latin typeface="Arial" panose="020B0604020202020204" pitchFamily="34" charset="0"/>
+                <a:cs typeface="Arial" panose="020B0604020202020204" pitchFamily="34" charset="0"/>
+              </a:rPr>
+              <a:t>C</a:t>
+            </a:r>
+          </a:p>
+        </p:txBody>
+      </p:sp>
       <p:grpSp>
         <p:nvGrpSpPr>
-          <p:cNvPr id="588" name="Group 587">
+          <p:cNvPr id="2" name="Group 1">
             <a:extLst>
               <a:ext uri="{FF2B5EF4-FFF2-40B4-BE49-F238E27FC236}">
-                <a16:creationId xmlns:a16="http://schemas.microsoft.com/office/drawing/2014/main" id="{E665BBED-5A89-344D-9E96-22EBF403C692}"/>
+                <a16:creationId xmlns:a16="http://schemas.microsoft.com/office/drawing/2014/main" id="{D0A1D1D8-CA58-4DBF-9AAC-CBF6EDCD4739}"/>
               </a:ext>
             </a:extLst>
           </p:cNvPr>
@@ -3768,223 +3782,12 @@
         </p:nvGrpSpPr>
         <p:grpSpPr>
           <a:xfrm>
-            <a:off x="0" y="3314664"/>
-            <a:ext cx="4215734" cy="1544565"/>
-            <a:chOff x="-59881" y="3477505"/>
-            <a:chExt cx="4215734" cy="1544565"/>
+            <a:off x="457982" y="3912243"/>
+            <a:ext cx="3757752" cy="1111197"/>
+            <a:chOff x="457982" y="3719739"/>
+            <a:chExt cx="3757752" cy="1111197"/>
           </a:xfrm>
         </p:grpSpPr>
-        <p:sp>
-          <p:nvSpPr>
-            <p:cNvPr id="236" name="TextBox 235">
-              <a:extLst>
-                <a:ext uri="{FF2B5EF4-FFF2-40B4-BE49-F238E27FC236}">
-                  <a16:creationId xmlns:a16="http://schemas.microsoft.com/office/drawing/2014/main" id="{2088A7FD-8328-7E42-94D4-C10D5946CE49}"/>
-                </a:ext>
-              </a:extLst>
-            </p:cNvPr>
-            <p:cNvSpPr txBox="1"/>
-            <p:nvPr/>
-          </p:nvSpPr>
-          <p:spPr>
-            <a:xfrm>
-              <a:off x="-59881" y="3477505"/>
-              <a:ext cx="317716" cy="369332"/>
-            </a:xfrm>
-            <a:prstGeom prst="rect">
-              <a:avLst/>
-            </a:prstGeom>
-            <a:noFill/>
-          </p:spPr>
-          <p:txBody>
-            <a:bodyPr wrap="none" rtlCol="0">
-              <a:spAutoFit/>
-            </a:bodyPr>
-            <a:lstStyle/>
-            <a:p>
-              <a:r>
-                <a:rPr lang="en-US" dirty="0"/>
-                <a:t>C</a:t>
-              </a:r>
-            </a:p>
-          </p:txBody>
-        </p:sp>
-        <p:pic>
-          <p:nvPicPr>
-            <p:cNvPr id="237" name="Picture 236">
-              <a:extLst>
-                <a:ext uri="{FF2B5EF4-FFF2-40B4-BE49-F238E27FC236}">
-                  <a16:creationId xmlns:a16="http://schemas.microsoft.com/office/drawing/2014/main" id="{C391D5D7-CA18-894C-A92C-64C077AED3AF}"/>
-                </a:ext>
-              </a:extLst>
-            </p:cNvPr>
-            <p:cNvPicPr>
-              <a:picLocks noChangeAspect="1"/>
-            </p:cNvPicPr>
-            <p:nvPr/>
-          </p:nvPicPr>
-          <p:blipFill rotWithShape="1">
-            <a:blip r:embed="rId3"/>
-            <a:srcRect l="15742" t="11839" r="790" b="63769"/>
-            <a:stretch/>
-          </p:blipFill>
-          <p:spPr>
-            <a:xfrm>
-              <a:off x="15257" y="3779183"/>
-              <a:ext cx="3511375" cy="452170"/>
-            </a:xfrm>
-            <a:prstGeom prst="rect">
-              <a:avLst/>
-            </a:prstGeom>
-          </p:spPr>
-        </p:pic>
-        <p:sp>
-          <p:nvSpPr>
-            <p:cNvPr id="583" name="Right Brace 582">
-              <a:extLst>
-                <a:ext uri="{FF2B5EF4-FFF2-40B4-BE49-F238E27FC236}">
-                  <a16:creationId xmlns:a16="http://schemas.microsoft.com/office/drawing/2014/main" id="{C12B441D-2F36-A047-A49D-A6A424AD351F}"/>
-                </a:ext>
-              </a:extLst>
-            </p:cNvPr>
-            <p:cNvSpPr/>
-            <p:nvPr/>
-          </p:nvSpPr>
-          <p:spPr>
-            <a:xfrm rot="5400000" flipV="1">
-              <a:off x="816896" y="3977807"/>
-              <a:ext cx="93214" cy="582562"/>
-            </a:xfrm>
-            <a:prstGeom prst="rightBrace">
-              <a:avLst/>
-            </a:prstGeom>
-            <a:ln w="19050">
-              <a:solidFill>
-                <a:schemeClr val="tx1"/>
-              </a:solidFill>
-            </a:ln>
-          </p:spPr>
-          <p:style>
-            <a:lnRef idx="1">
-              <a:schemeClr val="accent1"/>
-            </a:lnRef>
-            <a:fillRef idx="0">
-              <a:schemeClr val="accent1"/>
-            </a:fillRef>
-            <a:effectRef idx="0">
-              <a:schemeClr val="accent1"/>
-            </a:effectRef>
-            <a:fontRef idx="minor">
-              <a:schemeClr val="tx1"/>
-            </a:fontRef>
-          </p:style>
-          <p:txBody>
-            <a:bodyPr rtlCol="0" anchor="ctr"/>
-            <a:lstStyle/>
-            <a:p>
-              <a:pPr algn="ctr"/>
-              <a:endParaRPr lang="en-US"/>
-            </a:p>
-          </p:txBody>
-        </p:sp>
-        <p:sp>
-          <p:nvSpPr>
-            <p:cNvPr id="239" name="Right Brace 238">
-              <a:extLst>
-                <a:ext uri="{FF2B5EF4-FFF2-40B4-BE49-F238E27FC236}">
-                  <a16:creationId xmlns:a16="http://schemas.microsoft.com/office/drawing/2014/main" id="{ECEFE9FD-2D7F-F443-B574-969563D8AE57}"/>
-                </a:ext>
-              </a:extLst>
-            </p:cNvPr>
-            <p:cNvSpPr/>
-            <p:nvPr/>
-          </p:nvSpPr>
-          <p:spPr>
-            <a:xfrm rot="5400000" flipV="1">
-              <a:off x="576140" y="4569447"/>
-              <a:ext cx="110152" cy="117986"/>
-            </a:xfrm>
-            <a:prstGeom prst="rightBrace">
-              <a:avLst/>
-            </a:prstGeom>
-            <a:ln w="19050">
-              <a:solidFill>
-                <a:schemeClr val="tx1"/>
-              </a:solidFill>
-            </a:ln>
-          </p:spPr>
-          <p:style>
-            <a:lnRef idx="1">
-              <a:schemeClr val="accent1"/>
-            </a:lnRef>
-            <a:fillRef idx="0">
-              <a:schemeClr val="accent1"/>
-            </a:fillRef>
-            <a:effectRef idx="0">
-              <a:schemeClr val="accent1"/>
-            </a:effectRef>
-            <a:fontRef idx="minor">
-              <a:schemeClr val="tx1"/>
-            </a:fontRef>
-          </p:style>
-          <p:txBody>
-            <a:bodyPr rtlCol="0" anchor="ctr"/>
-            <a:lstStyle/>
-            <a:p>
-              <a:pPr algn="ctr"/>
-              <a:endParaRPr lang="en-US"/>
-            </a:p>
-          </p:txBody>
-        </p:sp>
-        <p:sp>
-          <p:nvSpPr>
-            <p:cNvPr id="242" name="Right Brace 241">
-              <a:extLst>
-                <a:ext uri="{FF2B5EF4-FFF2-40B4-BE49-F238E27FC236}">
-                  <a16:creationId xmlns:a16="http://schemas.microsoft.com/office/drawing/2014/main" id="{B38A69CF-773D-874E-B9F8-6B3770E99C26}"/>
-                </a:ext>
-              </a:extLst>
-            </p:cNvPr>
-            <p:cNvSpPr/>
-            <p:nvPr/>
-          </p:nvSpPr>
-          <p:spPr>
-            <a:xfrm rot="5400000" flipV="1">
-              <a:off x="885431" y="4413068"/>
-              <a:ext cx="101681" cy="422276"/>
-            </a:xfrm>
-            <a:prstGeom prst="rightBrace">
-              <a:avLst/>
-            </a:prstGeom>
-            <a:ln w="19050">
-              <a:solidFill>
-                <a:schemeClr val="tx1"/>
-              </a:solidFill>
-            </a:ln>
-          </p:spPr>
-          <p:style>
-            <a:lnRef idx="1">
-              <a:schemeClr val="accent1"/>
-            </a:lnRef>
-            <a:fillRef idx="0">
-              <a:schemeClr val="accent1"/>
-            </a:fillRef>
-            <a:effectRef idx="0">
-              <a:schemeClr val="accent1"/>
-            </a:effectRef>
-            <a:fontRef idx="minor">
-              <a:schemeClr val="tx1"/>
-            </a:fontRef>
-          </p:style>
-          <p:txBody>
-            <a:bodyPr rtlCol="0" anchor="ctr"/>
-            <a:lstStyle/>
-            <a:p>
-              <a:pPr algn="ctr"/>
-              <a:endParaRPr lang="en-US"/>
-            </a:p>
-          </p:txBody>
-        </p:sp>
         <p:sp>
           <p:nvSpPr>
             <p:cNvPr id="243" name="TextBox 242">
@@ -3999,7 +3802,7 @@
           </p:nvSpPr>
           <p:spPr>
             <a:xfrm>
-              <a:off x="383451" y="4315695"/>
+              <a:off x="457982" y="4156398"/>
               <a:ext cx="960103" cy="215444"/>
             </a:xfrm>
             <a:prstGeom prst="rect">
@@ -4046,7 +3849,7 @@
           </p:nvSpPr>
           <p:spPr>
             <a:xfrm>
-              <a:off x="336271" y="4683516"/>
+              <a:off x="461661" y="4492382"/>
               <a:ext cx="498119" cy="215444"/>
             </a:xfrm>
             <a:prstGeom prst="rect">
@@ -4093,7 +3896,7 @@
           </p:nvSpPr>
           <p:spPr>
             <a:xfrm>
-              <a:off x="723487" y="4683516"/>
+              <a:off x="762683" y="4492382"/>
               <a:ext cx="556361" cy="338554"/>
             </a:xfrm>
             <a:prstGeom prst="rect">
@@ -4143,7 +3946,7 @@
           </p:nvSpPr>
           <p:spPr>
             <a:xfrm>
-              <a:off x="1062066" y="4644889"/>
+              <a:off x="1164618" y="4492382"/>
               <a:ext cx="2995655" cy="215444"/>
             </a:xfrm>
             <a:prstGeom prst="rect">
@@ -4184,7 +3987,7 @@
           </p:nvSpPr>
           <p:spPr>
             <a:xfrm>
-              <a:off x="1062065" y="4338580"/>
+              <a:off x="1121946" y="4175739"/>
               <a:ext cx="3081000" cy="215444"/>
             </a:xfrm>
             <a:prstGeom prst="rect">
@@ -4225,7 +4028,7 @@
           </p:nvSpPr>
           <p:spPr>
             <a:xfrm>
-              <a:off x="3601770" y="3882580"/>
+              <a:off x="3661651" y="3719739"/>
               <a:ext cx="554083" cy="216621"/>
             </a:xfrm>
             <a:prstGeom prst="rect">
@@ -4283,7 +4086,7 @@
           </p:nvSpPr>
           <p:spPr>
             <a:xfrm rot="16200000">
-              <a:off x="3523302" y="3929154"/>
+              <a:off x="3569433" y="3766313"/>
               <a:ext cx="137631" cy="130970"/>
             </a:xfrm>
             <a:prstGeom prst="downArrow">
@@ -4316,6 +4119,209 @@
           </p:txBody>
         </p:sp>
       </p:grpSp>
+      <p:sp>
+        <p:nvSpPr>
+          <p:cNvPr id="3" name="Right Brace 2">
+            <a:extLst>
+              <a:ext uri="{FF2B5EF4-FFF2-40B4-BE49-F238E27FC236}">
+                <a16:creationId xmlns:a16="http://schemas.microsoft.com/office/drawing/2014/main" id="{37FE9297-6FAB-4569-9FE1-616688AA6C7B}"/>
+              </a:ext>
+            </a:extLst>
+          </p:cNvPr>
+          <p:cNvSpPr/>
+          <p:nvPr/>
+        </p:nvSpPr>
+        <p:spPr>
+          <a:xfrm rot="5400000">
+            <a:off x="888368" y="3976451"/>
+            <a:ext cx="99332" cy="611862"/>
+          </a:xfrm>
+          <a:prstGeom prst="rightBrace">
+            <a:avLst>
+              <a:gd name="adj1" fmla="val 75412"/>
+              <a:gd name="adj2" fmla="val 49887"/>
+            </a:avLst>
+          </a:prstGeom>
+          <a:ln w="12700"/>
+        </p:spPr>
+        <p:style>
+          <a:lnRef idx="1">
+            <a:schemeClr val="dk1"/>
+          </a:lnRef>
+          <a:fillRef idx="0">
+            <a:schemeClr val="dk1"/>
+          </a:fillRef>
+          <a:effectRef idx="0">
+            <a:schemeClr val="dk1"/>
+          </a:effectRef>
+          <a:fontRef idx="minor">
+            <a:schemeClr val="tx1"/>
+          </a:fontRef>
+        </p:style>
+        <p:txBody>
+          <a:bodyPr rtlCol="0" anchor="ctr"/>
+          <a:lstStyle/>
+          <a:p>
+            <a:pPr algn="ctr"/>
+            <a:endParaRPr lang="en-US"/>
+          </a:p>
+        </p:txBody>
+      </p:sp>
+      <p:sp>
+        <p:nvSpPr>
+          <p:cNvPr id="32" name="Right Brace 31">
+            <a:extLst>
+              <a:ext uri="{FF2B5EF4-FFF2-40B4-BE49-F238E27FC236}">
+                <a16:creationId xmlns:a16="http://schemas.microsoft.com/office/drawing/2014/main" id="{DA4EFED9-7149-449E-A093-B0D1ADBC2424}"/>
+              </a:ext>
+            </a:extLst>
+          </p:cNvPr>
+          <p:cNvSpPr/>
+          <p:nvPr/>
+        </p:nvSpPr>
+        <p:spPr>
+          <a:xfrm rot="5400000">
+            <a:off x="681082" y="4549946"/>
+            <a:ext cx="53306" cy="151265"/>
+          </a:xfrm>
+          <a:prstGeom prst="rightBrace">
+            <a:avLst>
+              <a:gd name="adj1" fmla="val 34124"/>
+              <a:gd name="adj2" fmla="val 49887"/>
+            </a:avLst>
+          </a:prstGeom>
+          <a:ln w="12700"/>
+        </p:spPr>
+        <p:style>
+          <a:lnRef idx="1">
+            <a:schemeClr val="dk1"/>
+          </a:lnRef>
+          <a:fillRef idx="0">
+            <a:schemeClr val="dk1"/>
+          </a:fillRef>
+          <a:effectRef idx="0">
+            <a:schemeClr val="dk1"/>
+          </a:effectRef>
+          <a:fontRef idx="minor">
+            <a:schemeClr val="tx1"/>
+          </a:fontRef>
+        </p:style>
+        <p:txBody>
+          <a:bodyPr rtlCol="0" anchor="ctr"/>
+          <a:lstStyle/>
+          <a:p>
+            <a:pPr algn="ctr"/>
+            <a:endParaRPr lang="en-US"/>
+          </a:p>
+        </p:txBody>
+      </p:sp>
+      <p:sp>
+        <p:nvSpPr>
+          <p:cNvPr id="33" name="Right Brace 32">
+            <a:extLst>
+              <a:ext uri="{FF2B5EF4-FFF2-40B4-BE49-F238E27FC236}">
+                <a16:creationId xmlns:a16="http://schemas.microsoft.com/office/drawing/2014/main" id="{456BB5F2-CF9A-4E36-B4D5-F266A4FB71F3}"/>
+              </a:ext>
+            </a:extLst>
+          </p:cNvPr>
+          <p:cNvSpPr/>
+          <p:nvPr/>
+        </p:nvSpPr>
+        <p:spPr>
+          <a:xfrm rot="5400000">
+            <a:off x="998440" y="4406042"/>
+            <a:ext cx="53308" cy="437742"/>
+          </a:xfrm>
+          <a:prstGeom prst="rightBrace">
+            <a:avLst>
+              <a:gd name="adj1" fmla="val 75412"/>
+              <a:gd name="adj2" fmla="val 49887"/>
+            </a:avLst>
+          </a:prstGeom>
+          <a:ln w="12700"/>
+        </p:spPr>
+        <p:style>
+          <a:lnRef idx="1">
+            <a:schemeClr val="dk1"/>
+          </a:lnRef>
+          <a:fillRef idx="0">
+            <a:schemeClr val="dk1"/>
+          </a:fillRef>
+          <a:effectRef idx="0">
+            <a:schemeClr val="dk1"/>
+          </a:effectRef>
+          <a:fontRef idx="minor">
+            <a:schemeClr val="tx1"/>
+          </a:fontRef>
+        </p:style>
+        <p:txBody>
+          <a:bodyPr rtlCol="0" anchor="ctr"/>
+          <a:lstStyle/>
+          <a:p>
+            <a:pPr algn="ctr"/>
+            <a:endParaRPr lang="en-US"/>
+          </a:p>
+        </p:txBody>
+      </p:sp>
+      <p:pic>
+        <p:nvPicPr>
+          <p:cNvPr id="6" name="Picture 5">
+            <a:extLst>
+              <a:ext uri="{FF2B5EF4-FFF2-40B4-BE49-F238E27FC236}">
+                <a16:creationId xmlns:a16="http://schemas.microsoft.com/office/drawing/2014/main" id="{B5353E5B-4962-44F6-A59D-4FB6C54172C8}"/>
+              </a:ext>
+            </a:extLst>
+          </p:cNvPr>
+          <p:cNvPicPr>
+            <a:picLocks noChangeAspect="1"/>
+          </p:cNvPicPr>
+          <p:nvPr/>
+        </p:nvPicPr>
+        <p:blipFill>
+          <a:blip r:embed="rId3"/>
+          <a:stretch>
+            <a:fillRect/>
+          </a:stretch>
+        </p:blipFill>
+        <p:spPr>
+          <a:xfrm>
+            <a:off x="-29941" y="1402260"/>
+            <a:ext cx="4206875" cy="1811594"/>
+          </a:xfrm>
+          <a:prstGeom prst="rect">
+            <a:avLst/>
+          </a:prstGeom>
+        </p:spPr>
+      </p:pic>
+      <p:pic>
+        <p:nvPicPr>
+          <p:cNvPr id="37" name="Picture 36">
+            <a:extLst>
+              <a:ext uri="{FF2B5EF4-FFF2-40B4-BE49-F238E27FC236}">
+                <a16:creationId xmlns:a16="http://schemas.microsoft.com/office/drawing/2014/main" id="{BEBED382-65F2-4222-B87A-CA77BA74306F}"/>
+              </a:ext>
+            </a:extLst>
+          </p:cNvPr>
+          <p:cNvPicPr>
+            <a:picLocks noChangeAspect="1"/>
+          </p:cNvPicPr>
+          <p:nvPr/>
+        </p:nvPicPr>
+        <p:blipFill rotWithShape="1">
+          <a:blip r:embed="rId3"/>
+          <a:srcRect b="64716"/>
+          <a:stretch/>
+        </p:blipFill>
+        <p:spPr>
+          <a:xfrm>
+            <a:off x="-606311" y="3610343"/>
+            <a:ext cx="4206875" cy="639193"/>
+          </a:xfrm>
+          <a:prstGeom prst="rect">
+            <a:avLst/>
+          </a:prstGeom>
+        </p:spPr>
+      </p:pic>
     </p:spTree>
     <p:extLst>
       <p:ext uri="{BB962C8B-B14F-4D97-AF65-F5344CB8AC3E}">

</xml_diff>